<commit_message>
-added V10 on the scope of functions -fixed typos and other minor improvements
</commit_message>
<xml_diff>
--- a/semaine2/CO12AL-W2-VIDEO01-SLIDE01.pptx
+++ b/semaine2/CO12AL-W2-VIDEO01-SLIDE01.pptx
@@ -4294,6 +4294,116 @@
       </p:grpSpPr>
       <p:sp>
         <p:nvSpPr>
+          <p:cNvPr id="3" name="ZoneTexte 2"/>
+          <p:cNvSpPr txBox="1"/>
+          <p:nvPr/>
+        </p:nvSpPr>
+        <p:spPr>
+          <a:xfrm>
+            <a:off x="855785" y="4466492"/>
+            <a:ext cx="7514492" cy="830997"/>
+          </a:xfrm>
+          <a:prstGeom prst="rect">
+            <a:avLst/>
+          </a:prstGeom>
+          <a:solidFill>
+            <a:schemeClr val="bg1"/>
+          </a:solidFill>
+        </p:spPr>
+        <p:txBody>
+          <a:bodyPr wrap="square" rtlCol="0">
+            <a:spAutoFit/>
+          </a:bodyPr>
+          <a:lstStyle/>
+          <a:p>
+            <a:r>
+              <a:rPr lang="fr-FR" dirty="0" smtClean="0">
+                <a:latin typeface="Courier New" panose="02070309020205020404" pitchFamily="49" charset="0"/>
+                <a:cs typeface="Courier New" panose="02070309020205020404" pitchFamily="49" charset="0"/>
+              </a:rPr>
+              <a:t>&gt;&gt;&gt; 'spam</a:t>
+            </a:r>
+            <a:r>
+              <a:rPr lang="fr-FR" dirty="0" smtClean="0">
+                <a:latin typeface="Courier New" panose="02070309020205020404" pitchFamily="49" charset="0"/>
+                <a:cs typeface="Courier New" panose="02070309020205020404" pitchFamily="49" charset="0"/>
+              </a:rPr>
+              <a:t>'.</a:t>
+            </a:r>
+            <a:r>
+              <a:rPr lang="fr-FR" dirty="0" err="1" smtClean="0">
+                <a:latin typeface="Courier New" panose="02070309020205020404" pitchFamily="49" charset="0"/>
+                <a:cs typeface="Courier New" panose="02070309020205020404" pitchFamily="49" charset="0"/>
+              </a:rPr>
+              <a:t>upper</a:t>
+            </a:r>
+            <a:r>
+              <a:rPr lang="fr-FR" dirty="0">
+                <a:latin typeface="Courier New" panose="02070309020205020404" pitchFamily="49" charset="0"/>
+                <a:cs typeface="Courier New" panose="02070309020205020404" pitchFamily="49" charset="0"/>
+              </a:rPr>
+              <a:t>()</a:t>
+            </a:r>
+          </a:p>
+          <a:p>
+            <a:endParaRPr lang="fr-FR" dirty="0">
+              <a:latin typeface="Courier New" panose="02070309020205020404" pitchFamily="49" charset="0"/>
+              <a:cs typeface="Courier New" panose="02070309020205020404" pitchFamily="49" charset="0"/>
+            </a:endParaRPr>
+          </a:p>
+        </p:txBody>
+      </p:sp>
+      <p:sp>
+        <p:nvSpPr>
+          <p:cNvPr id="17" name="ZoneTexte 16"/>
+          <p:cNvSpPr txBox="1"/>
+          <p:nvPr/>
+        </p:nvSpPr>
+        <p:spPr>
+          <a:xfrm>
+            <a:off x="855785" y="4466491"/>
+            <a:ext cx="7514492" cy="830997"/>
+          </a:xfrm>
+          <a:prstGeom prst="rect">
+            <a:avLst/>
+          </a:prstGeom>
+          <a:noFill/>
+        </p:spPr>
+        <p:txBody>
+          <a:bodyPr wrap="square" rtlCol="0">
+            <a:spAutoFit/>
+          </a:bodyPr>
+          <a:lstStyle/>
+          <a:p>
+            <a:r>
+              <a:rPr lang="fr-FR" dirty="0" smtClean="0">
+                <a:latin typeface="Courier New" panose="02070309020205020404" pitchFamily="49" charset="0"/>
+                <a:cs typeface="Courier New" panose="02070309020205020404" pitchFamily="49" charset="0"/>
+              </a:rPr>
+              <a:t>&gt;&gt;&gt; 'spam</a:t>
+            </a:r>
+            <a:r>
+              <a:rPr lang="fr-FR" dirty="0" smtClean="0">
+                <a:latin typeface="Courier New" panose="02070309020205020404" pitchFamily="49" charset="0"/>
+                <a:cs typeface="Courier New" panose="02070309020205020404" pitchFamily="49" charset="0"/>
+              </a:rPr>
+              <a:t>'</a:t>
+            </a:r>
+            <a:endParaRPr lang="fr-FR" dirty="0">
+              <a:latin typeface="Courier New" panose="02070309020205020404" pitchFamily="49" charset="0"/>
+              <a:cs typeface="Courier New" panose="02070309020205020404" pitchFamily="49" charset="0"/>
+            </a:endParaRPr>
+          </a:p>
+          <a:p>
+            <a:endParaRPr lang="fr-FR" dirty="0">
+              <a:latin typeface="Courier New" panose="02070309020205020404" pitchFamily="49" charset="0"/>
+              <a:cs typeface="Courier New" panose="02070309020205020404" pitchFamily="49" charset="0"/>
+            </a:endParaRPr>
+          </a:p>
+        </p:txBody>
+      </p:sp>
+      <p:sp>
+        <p:nvSpPr>
           <p:cNvPr id="5" name="Rectangle 4"/>
           <p:cNvSpPr/>
           <p:nvPr/>
@@ -4358,60 +4468,6 @@
       </p:sp>
       <p:sp>
         <p:nvSpPr>
-          <p:cNvPr id="3" name="ZoneTexte 2"/>
-          <p:cNvSpPr txBox="1"/>
-          <p:nvPr/>
-        </p:nvSpPr>
-        <p:spPr>
-          <a:xfrm>
-            <a:off x="855785" y="4466492"/>
-            <a:ext cx="7514492" cy="830997"/>
-          </a:xfrm>
-          <a:prstGeom prst="rect">
-            <a:avLst/>
-          </a:prstGeom>
-          <a:solidFill>
-            <a:schemeClr val="bg1"/>
-          </a:solidFill>
-        </p:spPr>
-        <p:txBody>
-          <a:bodyPr wrap="square" rtlCol="0">
-            <a:spAutoFit/>
-          </a:bodyPr>
-          <a:lstStyle/>
-          <a:p>
-            <a:r>
-              <a:rPr lang="fr-FR" dirty="0" smtClean="0">
-                <a:latin typeface="Courier New" panose="02070309020205020404" pitchFamily="49" charset="0"/>
-                <a:cs typeface="Courier New" panose="02070309020205020404" pitchFamily="49" charset="0"/>
-              </a:rPr>
-              <a:t>'spam'.</a:t>
-            </a:r>
-            <a:r>
-              <a:rPr lang="fr-FR" dirty="0" err="1" smtClean="0">
-                <a:latin typeface="Courier New" panose="02070309020205020404" pitchFamily="49" charset="0"/>
-                <a:cs typeface="Courier New" panose="02070309020205020404" pitchFamily="49" charset="0"/>
-              </a:rPr>
-              <a:t>upper</a:t>
-            </a:r>
-            <a:r>
-              <a:rPr lang="fr-FR" dirty="0">
-                <a:latin typeface="Courier New" panose="02070309020205020404" pitchFamily="49" charset="0"/>
-                <a:cs typeface="Courier New" panose="02070309020205020404" pitchFamily="49" charset="0"/>
-              </a:rPr>
-              <a:t>()</a:t>
-            </a:r>
-          </a:p>
-          <a:p>
-            <a:endParaRPr lang="fr-FR" dirty="0">
-              <a:latin typeface="Courier New" panose="02070309020205020404" pitchFamily="49" charset="0"/>
-              <a:cs typeface="Courier New" panose="02070309020205020404" pitchFamily="49" charset="0"/>
-            </a:endParaRPr>
-          </a:p>
-        </p:txBody>
-      </p:sp>
-      <p:sp>
-        <p:nvSpPr>
           <p:cNvPr id="10" name="ZoneTexte 9"/>
           <p:cNvSpPr txBox="1"/>
           <p:nvPr/>
@@ -4556,7 +4612,7 @@
         </p:nvCxnSpPr>
         <p:spPr bwMode="auto">
           <a:xfrm flipH="1">
-            <a:off x="2145323" y="4214445"/>
+            <a:off x="2851904" y="4066583"/>
             <a:ext cx="386862" cy="504093"/>
           </a:xfrm>
           <a:prstGeom prst="straightConnector1">
@@ -4575,48 +4631,6 @@
           <a:effectLst/>
         </p:spPr>
       </p:cxnSp>
-      <p:sp>
-        <p:nvSpPr>
-          <p:cNvPr id="17" name="ZoneTexte 16"/>
-          <p:cNvSpPr txBox="1"/>
-          <p:nvPr/>
-        </p:nvSpPr>
-        <p:spPr>
-          <a:xfrm>
-            <a:off x="855785" y="4466491"/>
-            <a:ext cx="7514492" cy="830997"/>
-          </a:xfrm>
-          <a:prstGeom prst="rect">
-            <a:avLst/>
-          </a:prstGeom>
-          <a:noFill/>
-        </p:spPr>
-        <p:txBody>
-          <a:bodyPr wrap="square" rtlCol="0">
-            <a:spAutoFit/>
-          </a:bodyPr>
-          <a:lstStyle/>
-          <a:p>
-            <a:r>
-              <a:rPr lang="fr-FR" dirty="0" smtClean="0">
-                <a:latin typeface="Courier New" panose="02070309020205020404" pitchFamily="49" charset="0"/>
-                <a:cs typeface="Courier New" panose="02070309020205020404" pitchFamily="49" charset="0"/>
-              </a:rPr>
-              <a:t>'spam'</a:t>
-            </a:r>
-            <a:endParaRPr lang="fr-FR" dirty="0">
-              <a:latin typeface="Courier New" panose="02070309020205020404" pitchFamily="49" charset="0"/>
-              <a:cs typeface="Courier New" panose="02070309020205020404" pitchFamily="49" charset="0"/>
-            </a:endParaRPr>
-          </a:p>
-          <a:p>
-            <a:endParaRPr lang="fr-FR" dirty="0">
-              <a:latin typeface="Courier New" panose="02070309020205020404" pitchFamily="49" charset="0"/>
-              <a:cs typeface="Courier New" panose="02070309020205020404" pitchFamily="49" charset="0"/>
-            </a:endParaRPr>
-          </a:p>
-        </p:txBody>
-      </p:sp>
       <p:sp>
         <p:nvSpPr>
           <p:cNvPr id="18" name="ZoneTexte 17"/>
@@ -5077,11 +5091,11 @@
       </p:par>
     </p:tnLst>
     <p:bldLst>
+      <p:bldP spid="17" grpId="0"/>
       <p:bldP spid="5" grpId="0" animBg="1"/>
       <p:bldP spid="10" grpId="0"/>
       <p:bldP spid="13" grpId="0"/>
       <p:bldP spid="14" grpId="0"/>
-      <p:bldP spid="17" grpId="0"/>
       <p:bldP spid="18" grpId="0"/>
     </p:bldLst>
   </p:timing>

</xml_diff>

<commit_message>
moves all slides to 16/9
</commit_message>
<xml_diff>
--- a/semaine2/CO12AL-W2-VIDEO01-SLIDE01.pptx
+++ b/semaine2/CO12AL-W2-VIDEO01-SLIDE01.pptx
@@ -13,7 +13,7 @@
   <p:sldIdLst>
     <p:sldId id="905" r:id="rId2"/>
   </p:sldIdLst>
-  <p:sldSz cx="9144000" cy="6858000" type="screen4x3"/>
+  <p:sldSz cx="12192000" cy="6858000"/>
   <p:notesSz cx="7099300" cy="10234613"/>
   <p:defaultTextStyle>
     <a:defPPr>
@@ -152,12 +152,12 @@
     </p:ext>
     <p:ext uri="{EFAFB233-063F-42B5-8137-9DF3F51BA10A}">
       <p15:sldGuideLst xmlns:p15="http://schemas.microsoft.com/office/powerpoint/2012/main">
-        <p15:guide id="1" orient="horz" pos="2160">
+        <p15:guide id="1" orient="horz" pos="2160" userDrawn="1">
           <p15:clr>
             <a:srgbClr val="A4A3A4"/>
           </p15:clr>
         </p15:guide>
-        <p15:guide id="2" pos="2880">
+        <p15:guide id="2" pos="3840" userDrawn="1">
           <p15:clr>
             <a:srgbClr val="A4A3A4"/>
           </p15:clr>
@@ -560,8 +560,8 @@
         </p:nvSpPr>
         <p:spPr bwMode="auto">
           <a:xfrm>
-            <a:off x="992188" y="768350"/>
-            <a:ext cx="5116512" cy="3836988"/>
+            <a:off x="141288" y="768350"/>
+            <a:ext cx="6818312" cy="3836988"/>
           </a:xfrm>
           <a:prstGeom prst="rect">
             <a:avLst/>
@@ -928,7 +928,12 @@
             <p:ph type="sldImg"/>
           </p:nvPr>
         </p:nvSpPr>
-        <p:spPr/>
+        <p:spPr>
+          <a:xfrm>
+            <a:off x="141288" y="768350"/>
+            <a:ext cx="6818312" cy="3836988"/>
+          </a:xfrm>
+        </p:spPr>
       </p:sp>
       <p:sp>
         <p:nvSpPr>
@@ -1024,8 +1029,8 @@
         </p:nvSpPr>
         <p:spPr>
           <a:xfrm>
-            <a:off x="685800" y="1219200"/>
-            <a:ext cx="7772400" cy="1470025"/>
+            <a:off x="914400" y="1219202"/>
+            <a:ext cx="10363200" cy="1470025"/>
           </a:xfrm>
         </p:spPr>
         <p:txBody>
@@ -1055,8 +1060,8 @@
         </p:nvSpPr>
         <p:spPr>
           <a:xfrm>
-            <a:off x="1295400" y="3048000"/>
-            <a:ext cx="6400800" cy="1752600"/>
+            <a:off x="1727200" y="3048000"/>
+            <a:ext cx="8534400" cy="1752600"/>
           </a:xfrm>
         </p:spPr>
         <p:txBody>
@@ -1088,8 +1093,8 @@
         </p:nvSpPr>
         <p:spPr>
           <a:xfrm>
-            <a:off x="457200" y="6248400"/>
-            <a:ext cx="2895600" cy="476250"/>
+            <a:off x="609600" y="6248400"/>
+            <a:ext cx="3860800" cy="476250"/>
           </a:xfrm>
         </p:spPr>
         <p:txBody>
@@ -1123,8 +1128,8 @@
         </p:nvSpPr>
         <p:spPr>
           <a:xfrm>
-            <a:off x="6553200" y="6245225"/>
-            <a:ext cx="2133600" cy="476250"/>
+            <a:off x="8737600" y="6245225"/>
+            <a:ext cx="2844800" cy="476250"/>
           </a:xfrm>
         </p:spPr>
         <p:txBody>
@@ -1363,8 +1368,8 @@
         </p:nvSpPr>
         <p:spPr>
           <a:xfrm>
-            <a:off x="6629400" y="274638"/>
-            <a:ext cx="2057400" cy="5851525"/>
+            <a:off x="8839200" y="274641"/>
+            <a:ext cx="2743200" cy="5851525"/>
           </a:xfrm>
         </p:spPr>
         <p:txBody>
@@ -1391,8 +1396,8 @@
         </p:nvSpPr>
         <p:spPr>
           <a:xfrm>
-            <a:off x="457200" y="274638"/>
-            <a:ext cx="6019800" cy="5851525"/>
+            <a:off x="609600" y="274641"/>
+            <a:ext cx="8026400" cy="5851525"/>
           </a:xfrm>
         </p:spPr>
         <p:txBody>
@@ -1541,8 +1546,8 @@
         </p:nvSpPr>
         <p:spPr>
           <a:xfrm>
-            <a:off x="457200" y="274638"/>
-            <a:ext cx="8229600" cy="1143000"/>
+            <a:off x="609600" y="274638"/>
+            <a:ext cx="10972800" cy="1143000"/>
           </a:xfrm>
         </p:spPr>
         <p:txBody>
@@ -1569,8 +1574,8 @@
         </p:nvSpPr>
         <p:spPr>
           <a:xfrm>
-            <a:off x="457200" y="1600200"/>
-            <a:ext cx="4038600" cy="4525963"/>
+            <a:off x="609600" y="1600203"/>
+            <a:ext cx="5384800" cy="4525963"/>
           </a:xfrm>
         </p:spPr>
         <p:txBody>
@@ -1626,8 +1631,8 @@
         </p:nvSpPr>
         <p:spPr>
           <a:xfrm>
-            <a:off x="4648200" y="1600200"/>
-            <a:ext cx="4038600" cy="4525963"/>
+            <a:off x="6197600" y="1600203"/>
+            <a:ext cx="5384800" cy="4525963"/>
           </a:xfrm>
         </p:spPr>
         <p:txBody>
@@ -1951,8 +1956,8 @@
         </p:nvSpPr>
         <p:spPr>
           <a:xfrm>
-            <a:off x="722313" y="4406900"/>
-            <a:ext cx="7772400" cy="1362075"/>
+            <a:off x="963084" y="4406903"/>
+            <a:ext cx="10363200" cy="1362075"/>
           </a:xfrm>
         </p:spPr>
         <p:txBody>
@@ -1983,8 +1988,8 @@
         </p:nvSpPr>
         <p:spPr>
           <a:xfrm>
-            <a:off x="722313" y="2906713"/>
-            <a:ext cx="7772400" cy="1500187"/>
+            <a:off x="963084" y="2906713"/>
+            <a:ext cx="10363200" cy="1500187"/>
           </a:xfrm>
         </p:spPr>
         <p:txBody>
@@ -2171,8 +2176,8 @@
         </p:nvSpPr>
         <p:spPr>
           <a:xfrm>
-            <a:off x="457200" y="1600200"/>
-            <a:ext cx="4038600" cy="4525963"/>
+            <a:off x="609600" y="1600203"/>
+            <a:ext cx="5384800" cy="4525963"/>
           </a:xfrm>
         </p:spPr>
         <p:txBody>
@@ -2256,8 +2261,8 @@
         </p:nvSpPr>
         <p:spPr>
           <a:xfrm>
-            <a:off x="4648200" y="1600200"/>
-            <a:ext cx="4038600" cy="4525963"/>
+            <a:off x="6197600" y="1600203"/>
+            <a:ext cx="5384800" cy="4525963"/>
           </a:xfrm>
         </p:spPr>
         <p:txBody>
@@ -2468,8 +2473,8 @@
         </p:nvSpPr>
         <p:spPr>
           <a:xfrm>
-            <a:off x="457200" y="1535113"/>
-            <a:ext cx="4040188" cy="639762"/>
+            <a:off x="609600" y="1535113"/>
+            <a:ext cx="5386917" cy="639762"/>
           </a:xfrm>
         </p:spPr>
         <p:txBody>
@@ -2533,8 +2538,8 @@
         </p:nvSpPr>
         <p:spPr>
           <a:xfrm>
-            <a:off x="457200" y="2174875"/>
-            <a:ext cx="4040188" cy="3951288"/>
+            <a:off x="609600" y="2174875"/>
+            <a:ext cx="5386917" cy="3951288"/>
           </a:xfrm>
         </p:spPr>
         <p:txBody>
@@ -2618,8 +2623,8 @@
         </p:nvSpPr>
         <p:spPr>
           <a:xfrm>
-            <a:off x="4645025" y="1535113"/>
-            <a:ext cx="4041775" cy="639762"/>
+            <a:off x="6193369" y="1535113"/>
+            <a:ext cx="5389033" cy="639762"/>
           </a:xfrm>
         </p:spPr>
         <p:txBody>
@@ -2683,8 +2688,8 @@
         </p:nvSpPr>
         <p:spPr>
           <a:xfrm>
-            <a:off x="4645025" y="2174875"/>
-            <a:ext cx="4041775" cy="3951288"/>
+            <a:off x="6193369" y="2174875"/>
+            <a:ext cx="5389033" cy="3951288"/>
           </a:xfrm>
         </p:spPr>
         <p:txBody>
@@ -3091,8 +3096,8 @@
         </p:nvSpPr>
         <p:spPr>
           <a:xfrm>
-            <a:off x="457200" y="273050"/>
-            <a:ext cx="3008313" cy="1162050"/>
+            <a:off x="609602" y="273050"/>
+            <a:ext cx="4011084" cy="1162050"/>
           </a:xfrm>
         </p:spPr>
         <p:txBody>
@@ -3123,8 +3128,8 @@
         </p:nvSpPr>
         <p:spPr>
           <a:xfrm>
-            <a:off x="3575050" y="273050"/>
-            <a:ext cx="5111750" cy="5853113"/>
+            <a:off x="4766733" y="273053"/>
+            <a:ext cx="6815667" cy="5853113"/>
           </a:xfrm>
         </p:spPr>
         <p:txBody>
@@ -3208,8 +3213,8 @@
         </p:nvSpPr>
         <p:spPr>
           <a:xfrm>
-            <a:off x="457200" y="1435100"/>
-            <a:ext cx="3008313" cy="4691063"/>
+            <a:off x="609602" y="1435103"/>
+            <a:ext cx="4011084" cy="4691063"/>
           </a:xfrm>
         </p:spPr>
         <p:txBody>
@@ -3366,8 +3371,8 @@
         </p:nvSpPr>
         <p:spPr>
           <a:xfrm>
-            <a:off x="1792288" y="4800600"/>
-            <a:ext cx="5486400" cy="566738"/>
+            <a:off x="2389717" y="4800600"/>
+            <a:ext cx="7315200" cy="566738"/>
           </a:xfrm>
         </p:spPr>
         <p:txBody>
@@ -3398,8 +3403,8 @@
         </p:nvSpPr>
         <p:spPr>
           <a:xfrm>
-            <a:off x="1792288" y="612775"/>
-            <a:ext cx="5486400" cy="4114800"/>
+            <a:off x="2389717" y="612775"/>
+            <a:ext cx="7315200" cy="4114800"/>
           </a:xfrm>
         </p:spPr>
         <p:txBody>
@@ -3460,8 +3465,8 @@
         </p:nvSpPr>
         <p:spPr>
           <a:xfrm>
-            <a:off x="1792288" y="5367338"/>
-            <a:ext cx="5486400" cy="804862"/>
+            <a:off x="2389717" y="5367338"/>
+            <a:ext cx="7315200" cy="804862"/>
           </a:xfrm>
         </p:spPr>
         <p:txBody>
@@ -3626,8 +3631,8 @@
         </p:nvSpPr>
         <p:spPr bwMode="auto">
           <a:xfrm>
-            <a:off x="457200" y="274638"/>
-            <a:ext cx="8229600" cy="1143000"/>
+            <a:off x="609600" y="274638"/>
+            <a:ext cx="10972800" cy="1143000"/>
           </a:xfrm>
           <a:prstGeom prst="rect">
             <a:avLst/>
@@ -3684,8 +3689,8 @@
         </p:nvSpPr>
         <p:spPr bwMode="auto">
           <a:xfrm>
-            <a:off x="457200" y="1600200"/>
-            <a:ext cx="8229600" cy="4525963"/>
+            <a:off x="609600" y="1600203"/>
+            <a:ext cx="10972800" cy="4525963"/>
           </a:xfrm>
           <a:prstGeom prst="rect">
             <a:avLst/>
@@ -3770,8 +3775,8 @@
         </p:nvSpPr>
         <p:spPr bwMode="auto">
           <a:xfrm>
-            <a:off x="0" y="6521450"/>
-            <a:ext cx="3967163" cy="336550"/>
+            <a:off x="2" y="6521450"/>
+            <a:ext cx="5289551" cy="336550"/>
           </a:xfrm>
           <a:prstGeom prst="rect">
             <a:avLst/>
@@ -3825,8 +3830,8 @@
         </p:nvSpPr>
         <p:spPr bwMode="auto">
           <a:xfrm>
-            <a:off x="7772400" y="6248400"/>
-            <a:ext cx="914400" cy="476250"/>
+            <a:off x="10363200" y="6248400"/>
+            <a:ext cx="1219200" cy="476250"/>
           </a:xfrm>
           <a:prstGeom prst="rect">
             <a:avLst/>
@@ -4300,8 +4305,8 @@
         </p:nvSpPr>
         <p:spPr>
           <a:xfrm>
-            <a:off x="855785" y="4466492"/>
-            <a:ext cx="7514492" cy="830997"/>
+            <a:off x="996464" y="4771296"/>
+            <a:ext cx="7514492" cy="1077218"/>
           </a:xfrm>
           <a:prstGeom prst="rect">
             <a:avLst/>
@@ -4317,28 +4322,21 @@
           <a:lstStyle/>
           <a:p>
             <a:r>
-              <a:rPr lang="fr-FR" dirty="0" smtClean="0">
+              <a:rPr lang="fr-FR" sz="3200" dirty="0">
                 <a:latin typeface="Courier New" panose="02070309020205020404" pitchFamily="49" charset="0"/>
                 <a:cs typeface="Courier New" panose="02070309020205020404" pitchFamily="49" charset="0"/>
               </a:rPr>
-              <a:t>&gt;&gt;&gt; 'spam</a:t>
-            </a:r>
-            <a:r>
-              <a:rPr lang="fr-FR" dirty="0" smtClean="0">
-                <a:latin typeface="Courier New" panose="02070309020205020404" pitchFamily="49" charset="0"/>
-                <a:cs typeface="Courier New" panose="02070309020205020404" pitchFamily="49" charset="0"/>
-              </a:rPr>
-              <a:t>'.</a:t>
-            </a:r>
-            <a:r>
-              <a:rPr lang="fr-FR" dirty="0" err="1" smtClean="0">
+              <a:t>&gt;&gt;&gt; 'spam'.</a:t>
+            </a:r>
+            <a:r>
+              <a:rPr lang="fr-FR" sz="3200" dirty="0" err="1">
                 <a:latin typeface="Courier New" panose="02070309020205020404" pitchFamily="49" charset="0"/>
                 <a:cs typeface="Courier New" panose="02070309020205020404" pitchFamily="49" charset="0"/>
               </a:rPr>
               <a:t>upper</a:t>
             </a:r>
             <a:r>
-              <a:rPr lang="fr-FR" dirty="0">
+              <a:rPr lang="fr-FR" sz="3200" dirty="0">
                 <a:latin typeface="Courier New" panose="02070309020205020404" pitchFamily="49" charset="0"/>
                 <a:cs typeface="Courier New" panose="02070309020205020404" pitchFamily="49" charset="0"/>
               </a:rPr>
@@ -4346,7 +4344,7 @@
             </a:r>
           </a:p>
           <a:p>
-            <a:endParaRPr lang="fr-FR" dirty="0">
+            <a:endParaRPr lang="fr-FR" sz="3200" dirty="0">
               <a:latin typeface="Courier New" panose="02070309020205020404" pitchFamily="49" charset="0"/>
               <a:cs typeface="Courier New" panose="02070309020205020404" pitchFamily="49" charset="0"/>
             </a:endParaRPr>
@@ -4361,8 +4359,8 @@
         </p:nvSpPr>
         <p:spPr>
           <a:xfrm>
-            <a:off x="855785" y="4466491"/>
-            <a:ext cx="7514492" cy="830997"/>
+            <a:off x="996464" y="4771295"/>
+            <a:ext cx="7514492" cy="1077218"/>
           </a:xfrm>
           <a:prstGeom prst="rect">
             <a:avLst/>
@@ -4376,26 +4374,19 @@
           <a:lstStyle/>
           <a:p>
             <a:r>
-              <a:rPr lang="fr-FR" dirty="0" smtClean="0">
+              <a:rPr lang="fr-FR" sz="3200" dirty="0">
                 <a:latin typeface="Courier New" panose="02070309020205020404" pitchFamily="49" charset="0"/>
                 <a:cs typeface="Courier New" panose="02070309020205020404" pitchFamily="49" charset="0"/>
               </a:rPr>
-              <a:t>&gt;&gt;&gt; 'spam</a:t>
-            </a:r>
-            <a:r>
-              <a:rPr lang="fr-FR" dirty="0" smtClean="0">
-                <a:latin typeface="Courier New" panose="02070309020205020404" pitchFamily="49" charset="0"/>
-                <a:cs typeface="Courier New" panose="02070309020205020404" pitchFamily="49" charset="0"/>
-              </a:rPr>
-              <a:t>'</a:t>
-            </a:r>
-            <a:endParaRPr lang="fr-FR" dirty="0">
+              <a:t>&gt;&gt;&gt; 'spam'</a:t>
+            </a:r>
+            <a:endParaRPr lang="fr-FR" sz="3200" dirty="0">
               <a:latin typeface="Courier New" panose="02070309020205020404" pitchFamily="49" charset="0"/>
               <a:cs typeface="Courier New" panose="02070309020205020404" pitchFamily="49" charset="0"/>
             </a:endParaRPr>
           </a:p>
           <a:p>
-            <a:endParaRPr lang="fr-FR" dirty="0">
+            <a:endParaRPr lang="fr-FR" sz="3200" dirty="0">
               <a:latin typeface="Courier New" panose="02070309020205020404" pitchFamily="49" charset="0"/>
               <a:cs typeface="Courier New" panose="02070309020205020404" pitchFamily="49" charset="0"/>
             </a:endParaRPr>
@@ -4410,8 +4401,8 @@
         </p:nvSpPr>
         <p:spPr bwMode="auto">
           <a:xfrm>
-            <a:off x="984738" y="917331"/>
-            <a:ext cx="2510693" cy="2184400"/>
+            <a:off x="4396156" y="956648"/>
+            <a:ext cx="2895598" cy="3150149"/>
           </a:xfrm>
           <a:prstGeom prst="rect">
             <a:avLst/>
@@ -4437,32 +4428,12 @@
           </a:bodyPr>
           <a:lstStyle/>
           <a:p>
-            <a:pPr marL="0" marR="0" indent="0" algn="ctr" defTabSz="914400" rtl="0" eaLnBrk="1" fontAlgn="base" latinLnBrk="0" hangingPunct="1">
-              <a:lnSpc>
-                <a:spcPct val="100000"/>
-              </a:lnSpc>
+            <a:pPr algn="ctr">
               <a:spcBef>
                 <a:spcPct val="50000"/>
               </a:spcBef>
-              <a:spcAft>
-                <a:spcPct val="0"/>
-              </a:spcAft>
-              <a:buClrTx/>
-              <a:buSzTx/>
-              <a:buFontTx/>
-              <a:buNone/>
-              <a:tabLst/>
             </a:pPr>
-            <a:endParaRPr kumimoji="0" lang="fr-FR" sz="2400" b="0" i="0" u="none" strike="noStrike" cap="none" normalizeH="0" baseline="0" smtClean="0">
-              <a:ln>
-                <a:noFill/>
-              </a:ln>
-              <a:solidFill>
-                <a:schemeClr val="tx1"/>
-              </a:solidFill>
-              <a:effectLst/>
-              <a:latin typeface="Comic Sans MS" pitchFamily="66" charset="0"/>
-            </a:endParaRPr>
+            <a:endParaRPr lang="fr-FR"/>
           </a:p>
         </p:txBody>
       </p:sp>
@@ -4474,8 +4445,8 @@
         </p:nvSpPr>
         <p:spPr>
           <a:xfrm>
-            <a:off x="984738" y="351550"/>
-            <a:ext cx="5061438" cy="461665"/>
+            <a:off x="2567354" y="178634"/>
+            <a:ext cx="8065477" cy="646331"/>
           </a:xfrm>
           <a:prstGeom prst="rect">
             <a:avLst/>
@@ -4489,12 +4460,12 @@
           <a:lstStyle/>
           <a:p>
             <a:r>
-              <a:rPr lang="fr-FR" dirty="0" smtClean="0">
+              <a:rPr lang="fr-FR" sz="3600" dirty="0">
                 <a:latin typeface="Calibri" panose="020F0502020204030204" pitchFamily="34" charset="0"/>
               </a:rPr>
               <a:t>Objet de type chaîne de caractères</a:t>
             </a:r>
-            <a:endParaRPr lang="fr-FR" dirty="0">
+            <a:endParaRPr lang="fr-FR" sz="3600" dirty="0">
               <a:latin typeface="Calibri" panose="020F0502020204030204" pitchFamily="34" charset="0"/>
             </a:endParaRPr>
           </a:p>
@@ -4508,8 +4479,8 @@
         </p:nvSpPr>
         <p:spPr>
           <a:xfrm>
-            <a:off x="1069730" y="1080239"/>
-            <a:ext cx="2341684" cy="830997"/>
+            <a:off x="4695341" y="1000371"/>
+            <a:ext cx="2341684" cy="1077218"/>
           </a:xfrm>
           <a:prstGeom prst="rect">
             <a:avLst/>
@@ -4523,7 +4494,7 @@
           <a:lstStyle/>
           <a:p>
             <a:r>
-              <a:rPr lang="fr-FR" u="sng" dirty="0" smtClean="0">
+              <a:rPr lang="fr-FR" sz="3200" u="sng" dirty="0">
                 <a:latin typeface="Calibri" panose="020F0502020204030204" pitchFamily="34" charset="0"/>
               </a:rPr>
               <a:t>Information:</a:t>
@@ -4531,12 +4502,12 @@
           </a:p>
           <a:p>
             <a:r>
-              <a:rPr lang="fr-FR" dirty="0" smtClean="0">
+              <a:rPr lang="fr-FR" sz="3200" dirty="0">
                 <a:latin typeface="Calibri" panose="020F0502020204030204" pitchFamily="34" charset="0"/>
               </a:rPr>
               <a:t>'spam'</a:t>
             </a:r>
-            <a:endParaRPr lang="fr-FR" dirty="0">
+            <a:endParaRPr lang="fr-FR" sz="3200" dirty="0">
               <a:latin typeface="Calibri" panose="020F0502020204030204" pitchFamily="34" charset="0"/>
             </a:endParaRPr>
           </a:p>
@@ -4550,8 +4521,8 @@
         </p:nvSpPr>
         <p:spPr>
           <a:xfrm>
-            <a:off x="1069242" y="1875119"/>
-            <a:ext cx="2341684" cy="1200329"/>
+            <a:off x="4695341" y="2101137"/>
+            <a:ext cx="2341684" cy="1569660"/>
           </a:xfrm>
           <a:prstGeom prst="rect">
             <a:avLst/>
@@ -4565,13 +4536,13 @@
           <a:lstStyle/>
           <a:p>
             <a:r>
-              <a:rPr lang="fr-FR" u="sng" dirty="0" smtClean="0">
+              <a:rPr lang="fr-FR" sz="3200" u="sng" dirty="0">
                 <a:latin typeface="Calibri" panose="020F0502020204030204" pitchFamily="34" charset="0"/>
               </a:rPr>
               <a:t>Méthodes</a:t>
             </a:r>
             <a:r>
-              <a:rPr lang="fr-FR" dirty="0" smtClean="0">
+              <a:rPr lang="fr-FR" sz="3200" dirty="0">
                 <a:latin typeface="Calibri" panose="020F0502020204030204" pitchFamily="34" charset="0"/>
               </a:rPr>
               <a:t>:</a:t>
@@ -4579,7 +4550,7 @@
           </a:p>
           <a:p>
             <a:r>
-              <a:rPr lang="fr-FR" dirty="0" smtClean="0">
+              <a:rPr lang="fr-FR" sz="3200" dirty="0">
                 <a:latin typeface="Calibri" panose="020F0502020204030204" pitchFamily="34" charset="0"/>
               </a:rPr>
               <a:t>…</a:t>
@@ -4587,18 +4558,18 @@
           </a:p>
           <a:p>
             <a:r>
-              <a:rPr lang="fr-FR" dirty="0" err="1" smtClean="0">
+              <a:rPr lang="fr-FR" sz="3200" dirty="0" err="1">
                 <a:latin typeface="Calibri" panose="020F0502020204030204" pitchFamily="34" charset="0"/>
               </a:rPr>
               <a:t>upper</a:t>
             </a:r>
             <a:r>
-              <a:rPr lang="fr-FR" dirty="0" smtClean="0">
+              <a:rPr lang="fr-FR" sz="3200" dirty="0">
                 <a:latin typeface="Calibri" panose="020F0502020204030204" pitchFamily="34" charset="0"/>
               </a:rPr>
               <a:t>()</a:t>
             </a:r>
-            <a:endParaRPr lang="fr-FR" dirty="0">
+            <a:endParaRPr lang="fr-FR" sz="3200" dirty="0">
               <a:latin typeface="Calibri" panose="020F0502020204030204" pitchFamily="34" charset="0"/>
             </a:endParaRPr>
           </a:p>
@@ -4612,7 +4583,7 @@
         </p:nvCxnSpPr>
         <p:spPr bwMode="auto">
           <a:xfrm flipH="1">
-            <a:off x="2851904" y="4066583"/>
+            <a:off x="3675185" y="4495805"/>
             <a:ext cx="386862" cy="504093"/>
           </a:xfrm>
           <a:prstGeom prst="straightConnector1">
@@ -4639,8 +4610,8 @@
         </p:nvSpPr>
         <p:spPr>
           <a:xfrm>
-            <a:off x="855785" y="5000255"/>
-            <a:ext cx="7514492" cy="830997"/>
+            <a:off x="996464" y="5305059"/>
+            <a:ext cx="7514492" cy="1077218"/>
           </a:xfrm>
           <a:prstGeom prst="rect">
             <a:avLst/>
@@ -4654,19 +4625,19 @@
           <a:lstStyle/>
           <a:p>
             <a:r>
-              <a:rPr lang="fr-FR" dirty="0" smtClean="0">
+              <a:rPr lang="fr-FR" sz="3200" dirty="0">
                 <a:latin typeface="Courier New" panose="02070309020205020404" pitchFamily="49" charset="0"/>
                 <a:cs typeface="Courier New" panose="02070309020205020404" pitchFamily="49" charset="0"/>
               </a:rPr>
               <a:t>'SPAM'</a:t>
             </a:r>
-            <a:endParaRPr lang="fr-FR" dirty="0">
+            <a:endParaRPr lang="fr-FR" sz="3200" dirty="0">
               <a:latin typeface="Courier New" panose="02070309020205020404" pitchFamily="49" charset="0"/>
               <a:cs typeface="Courier New" panose="02070309020205020404" pitchFamily="49" charset="0"/>
             </a:endParaRPr>
           </a:p>
           <a:p>
-            <a:endParaRPr lang="fr-FR" dirty="0">
+            <a:endParaRPr lang="fr-FR" sz="3200" dirty="0">
               <a:latin typeface="Courier New" panose="02070309020205020404" pitchFamily="49" charset="0"/>
               <a:cs typeface="Courier New" panose="02070309020205020404" pitchFamily="49" charset="0"/>
             </a:endParaRPr>

</xml_diff>

<commit_message>
updated slide CO12AL-W2-VIDEO01-SLIDE01.pptx  according to Thierry comments Typos and minor modifs
</commit_message>
<xml_diff>
--- a/semaine2/CO12AL-W2-VIDEO01-SLIDE01.pptx
+++ b/semaine2/CO12AL-W2-VIDEO01-SLIDE01.pptx
@@ -952,7 +952,15 @@
           <a:p>
             <a:r>
               <a:rPr lang="fr-FR" dirty="0" smtClean="0"/>
-              <a:t>(43s)</a:t>
+              <a:t>En Python</a:t>
+            </a:r>
+            <a:r>
+              <a:rPr lang="fr-FR" baseline="0" dirty="0" smtClean="0"/>
+              <a:t> tout est un objet, donc on appelle toujours une méthode sur l’objet de la </a:t>
+            </a:r>
+            <a:r>
+              <a:rPr lang="fr-FR" baseline="0" smtClean="0"/>
+              <a:t>même manière</a:t>
             </a:r>
             <a:endParaRPr lang="fr-FR" dirty="0"/>
           </a:p>
@@ -4326,7 +4334,17 @@
                 <a:latin typeface="Courier New" panose="02070309020205020404" pitchFamily="49" charset="0"/>
                 <a:cs typeface="Courier New" panose="02070309020205020404" pitchFamily="49" charset="0"/>
               </a:rPr>
-              <a:t>&gt;&gt;&gt; 'spam'.</a:t>
+              <a:t>&gt;&gt;&gt; 'spam'</a:t>
+            </a:r>
+            <a:r>
+              <a:rPr lang="fr-FR" sz="3200" dirty="0">
+                <a:solidFill>
+                  <a:srgbClr val="FF0000"/>
+                </a:solidFill>
+                <a:latin typeface="Courier New" panose="02070309020205020404" pitchFamily="49" charset="0"/>
+                <a:cs typeface="Courier New" panose="02070309020205020404" pitchFamily="49" charset="0"/>
+              </a:rPr>
+              <a:t>.</a:t>
             </a:r>
             <a:r>
               <a:rPr lang="fr-FR" sz="3200" dirty="0" err="1">
@@ -4359,7 +4377,7 @@
         </p:nvSpPr>
         <p:spPr>
           <a:xfrm>
-            <a:off x="996464" y="4771295"/>
+            <a:off x="996464" y="1786754"/>
             <a:ext cx="7514492" cy="1077218"/>
           </a:xfrm>
           <a:prstGeom prst="rect">
@@ -4380,17 +4398,13 @@
               </a:rPr>
               <a:t>&gt;&gt;&gt; 'spam'</a:t>
             </a:r>
+          </a:p>
+          <a:p>
             <a:endParaRPr lang="fr-FR" sz="3200" dirty="0">
               <a:latin typeface="Courier New" panose="02070309020205020404" pitchFamily="49" charset="0"/>
               <a:cs typeface="Courier New" panose="02070309020205020404" pitchFamily="49" charset="0"/>
             </a:endParaRPr>
           </a:p>
-          <a:p>
-            <a:endParaRPr lang="fr-FR" sz="3200" dirty="0">
-              <a:latin typeface="Courier New" panose="02070309020205020404" pitchFamily="49" charset="0"/>
-              <a:cs typeface="Courier New" panose="02070309020205020404" pitchFamily="49" charset="0"/>
-            </a:endParaRPr>
-          </a:p>
         </p:txBody>
       </p:sp>
       <p:sp>
@@ -4401,7 +4415,7 @@
         </p:nvSpPr>
         <p:spPr bwMode="auto">
           <a:xfrm>
-            <a:off x="4396156" y="956648"/>
+            <a:off x="8211771" y="2982329"/>
             <a:ext cx="2895598" cy="3150149"/>
           </a:xfrm>
           <a:prstGeom prst="rect">
@@ -4410,7 +4424,7 @@
           <a:noFill/>
           <a:ln w="38100" cap="flat" cmpd="sng" algn="ctr">
             <a:solidFill>
-              <a:srgbClr val="FF0000"/>
+              <a:schemeClr val="tx1"/>
             </a:solidFill>
             <a:prstDash val="solid"/>
             <a:round/>
@@ -4445,8 +4459,8 @@
         </p:nvSpPr>
         <p:spPr>
           <a:xfrm>
-            <a:off x="2567354" y="178634"/>
-            <a:ext cx="8065477" cy="646331"/>
+            <a:off x="7649307" y="1758452"/>
+            <a:ext cx="3997569" cy="1200329"/>
           </a:xfrm>
           <a:prstGeom prst="rect">
             <a:avLst/>
@@ -4459,15 +4473,13 @@
           </a:bodyPr>
           <a:lstStyle/>
           <a:p>
+            <a:pPr algn="ctr"/>
             <a:r>
               <a:rPr lang="fr-FR" sz="3600" dirty="0">
                 <a:latin typeface="Calibri" panose="020F0502020204030204" pitchFamily="34" charset="0"/>
               </a:rPr>
               <a:t>Objet de type chaîne de caractères</a:t>
             </a:r>
-            <a:endParaRPr lang="fr-FR" sz="3600" dirty="0">
-              <a:latin typeface="Calibri" panose="020F0502020204030204" pitchFamily="34" charset="0"/>
-            </a:endParaRPr>
           </a:p>
         </p:txBody>
       </p:sp>
@@ -4479,7 +4491,7 @@
         </p:nvSpPr>
         <p:spPr>
           <a:xfrm>
-            <a:off x="4695341" y="1000371"/>
+            <a:off x="8510956" y="3026052"/>
             <a:ext cx="2341684" cy="1077218"/>
           </a:xfrm>
           <a:prstGeom prst="rect">
@@ -4507,9 +4519,6 @@
               </a:rPr>
               <a:t>'spam'</a:t>
             </a:r>
-            <a:endParaRPr lang="fr-FR" sz="3200" dirty="0">
-              <a:latin typeface="Calibri" panose="020F0502020204030204" pitchFamily="34" charset="0"/>
-            </a:endParaRPr>
           </a:p>
         </p:txBody>
       </p:sp>
@@ -4521,7 +4530,7 @@
         </p:nvSpPr>
         <p:spPr>
           <a:xfrm>
-            <a:off x="4695341" y="2101137"/>
+            <a:off x="8510956" y="4126818"/>
             <a:ext cx="2341684" cy="1569660"/>
           </a:xfrm>
           <a:prstGeom prst="rect">
@@ -4569,39 +4578,9 @@
               </a:rPr>
               <a:t>()</a:t>
             </a:r>
-            <a:endParaRPr lang="fr-FR" sz="3200" dirty="0">
-              <a:latin typeface="Calibri" panose="020F0502020204030204" pitchFamily="34" charset="0"/>
-            </a:endParaRPr>
-          </a:p>
-        </p:txBody>
-      </p:sp>
-      <p:cxnSp>
-        <p:nvCxnSpPr>
-          <p:cNvPr id="16" name="Connecteur droit avec flèche 15"/>
-          <p:cNvCxnSpPr/>
-          <p:nvPr/>
-        </p:nvCxnSpPr>
-        <p:spPr bwMode="auto">
-          <a:xfrm flipH="1">
-            <a:off x="3675185" y="4495805"/>
-            <a:ext cx="386862" cy="504093"/>
-          </a:xfrm>
-          <a:prstGeom prst="straightConnector1">
-            <a:avLst/>
-          </a:prstGeom>
-          <a:noFill/>
-          <a:ln w="53975" cap="flat" cmpd="sng" algn="ctr">
-            <a:solidFill>
-              <a:srgbClr val="FF0000"/>
-            </a:solidFill>
-            <a:prstDash val="solid"/>
-            <a:round/>
-            <a:headEnd type="none" w="med" len="med"/>
-            <a:tailEnd type="triangle" w="med" len="med"/>
-          </a:ln>
-          <a:effectLst/>
-        </p:spPr>
-      </p:cxnSp>
+          </a:p>
+        </p:txBody>
+      </p:sp>
       <p:sp>
         <p:nvSpPr>
           <p:cNvPr id="18" name="ZoneTexte 17"/>
@@ -4631,15 +4610,177 @@
               </a:rPr>
               <a:t>'SPAM'</a:t>
             </a:r>
+          </a:p>
+          <a:p>
             <a:endParaRPr lang="fr-FR" sz="3200" dirty="0">
               <a:latin typeface="Courier New" panose="02070309020205020404" pitchFamily="49" charset="0"/>
               <a:cs typeface="Courier New" panose="02070309020205020404" pitchFamily="49" charset="0"/>
             </a:endParaRPr>
           </a:p>
-          <a:p>
-            <a:endParaRPr lang="fr-FR" sz="3200" dirty="0">
-              <a:latin typeface="Courier New" panose="02070309020205020404" pitchFamily="49" charset="0"/>
-              <a:cs typeface="Courier New" panose="02070309020205020404" pitchFamily="49" charset="0"/>
+        </p:txBody>
+      </p:sp>
+      <p:sp>
+        <p:nvSpPr>
+          <p:cNvPr id="2" name="Rectangle 1"/>
+          <p:cNvSpPr/>
+          <p:nvPr/>
+        </p:nvSpPr>
+        <p:spPr bwMode="auto">
+          <a:xfrm>
+            <a:off x="7397262" y="956648"/>
+            <a:ext cx="4501661" cy="5678614"/>
+          </a:xfrm>
+          <a:prstGeom prst="rect">
+            <a:avLst/>
+          </a:prstGeom>
+          <a:noFill/>
+          <a:ln w="38100" cap="flat" cmpd="sng" algn="ctr">
+            <a:solidFill>
+              <a:schemeClr val="tx1"/>
+            </a:solidFill>
+            <a:prstDash val="solid"/>
+            <a:round/>
+            <a:headEnd type="none" w="med" len="med"/>
+            <a:tailEnd type="none" w="med" len="med"/>
+          </a:ln>
+          <a:effectLst/>
+        </p:spPr>
+        <p:txBody>
+          <a:bodyPr vert="horz" wrap="square" lIns="90000" tIns="46800" rIns="90000" bIns="46800" numCol="1" rtlCol="0" anchor="ctr" anchorCtr="0" compatLnSpc="1">
+            <a:prstTxWarp prst="textNoShape">
+              <a:avLst/>
+            </a:prstTxWarp>
+            <a:spAutoFit/>
+          </a:bodyPr>
+          <a:lstStyle/>
+          <a:p>
+            <a:pPr marL="0" marR="0" indent="0" algn="ctr" defTabSz="914400" rtl="0" eaLnBrk="1" fontAlgn="base" latinLnBrk="0" hangingPunct="1">
+              <a:lnSpc>
+                <a:spcPct val="100000"/>
+              </a:lnSpc>
+              <a:spcBef>
+                <a:spcPct val="50000"/>
+              </a:spcBef>
+              <a:spcAft>
+                <a:spcPct val="0"/>
+              </a:spcAft>
+              <a:buClrTx/>
+              <a:buSzTx/>
+              <a:buFontTx/>
+              <a:buNone/>
+              <a:tabLst/>
+            </a:pPr>
+            <a:endParaRPr kumimoji="0" lang="fr-FR" sz="2400" b="0" i="0" u="none" strike="noStrike" cap="none" normalizeH="0" baseline="0" smtClean="0">
+              <a:ln>
+                <a:noFill/>
+              </a:ln>
+              <a:solidFill>
+                <a:schemeClr val="tx1"/>
+              </a:solidFill>
+              <a:effectLst/>
+              <a:latin typeface="Comic Sans MS" pitchFamily="66" charset="0"/>
+            </a:endParaRPr>
+          </a:p>
+        </p:txBody>
+      </p:sp>
+      <p:sp>
+        <p:nvSpPr>
+          <p:cNvPr id="4" name="ZoneTexte 3"/>
+          <p:cNvSpPr txBox="1"/>
+          <p:nvPr/>
+        </p:nvSpPr>
+        <p:spPr>
+          <a:xfrm>
+            <a:off x="8656029" y="205833"/>
+            <a:ext cx="2051538" cy="769441"/>
+          </a:xfrm>
+          <a:prstGeom prst="rect">
+            <a:avLst/>
+          </a:prstGeom>
+          <a:noFill/>
+        </p:spPr>
+        <p:txBody>
+          <a:bodyPr wrap="square" rtlCol="0">
+            <a:spAutoFit/>
+          </a:bodyPr>
+          <a:lstStyle/>
+          <a:p>
+            <a:r>
+              <a:rPr lang="fr-FR" sz="4400" dirty="0" smtClean="0">
+                <a:latin typeface="Calibri" panose="020F0502020204030204" pitchFamily="34" charset="0"/>
+              </a:rPr>
+              <a:t>Objets</a:t>
+            </a:r>
+            <a:endParaRPr lang="fr-FR" sz="4400" dirty="0">
+              <a:latin typeface="Calibri" panose="020F0502020204030204" pitchFamily="34" charset="0"/>
+            </a:endParaRPr>
+          </a:p>
+        </p:txBody>
+      </p:sp>
+      <p:sp>
+        <p:nvSpPr>
+          <p:cNvPr id="6" name="ZoneTexte 5"/>
+          <p:cNvSpPr txBox="1"/>
+          <p:nvPr/>
+        </p:nvSpPr>
+        <p:spPr>
+          <a:xfrm>
+            <a:off x="876303" y="764328"/>
+            <a:ext cx="4853351" cy="769441"/>
+          </a:xfrm>
+          <a:prstGeom prst="rect">
+            <a:avLst/>
+          </a:prstGeom>
+          <a:noFill/>
+        </p:spPr>
+        <p:txBody>
+          <a:bodyPr wrap="square" rtlCol="0">
+            <a:spAutoFit/>
+          </a:bodyPr>
+          <a:lstStyle/>
+          <a:p>
+            <a:r>
+              <a:rPr lang="fr-FR" sz="4400" dirty="0" smtClean="0">
+                <a:latin typeface="Calibri" panose="020F0502020204030204" pitchFamily="34" charset="0"/>
+              </a:rPr>
+              <a:t>Création de l’objet</a:t>
+            </a:r>
+            <a:endParaRPr lang="fr-FR" sz="4400" dirty="0">
+              <a:latin typeface="Calibri" panose="020F0502020204030204" pitchFamily="34" charset="0"/>
+            </a:endParaRPr>
+          </a:p>
+        </p:txBody>
+      </p:sp>
+      <p:sp>
+        <p:nvSpPr>
+          <p:cNvPr id="15" name="ZoneTexte 14"/>
+          <p:cNvSpPr txBox="1"/>
+          <p:nvPr/>
+        </p:nvSpPr>
+        <p:spPr>
+          <a:xfrm>
+            <a:off x="876302" y="3795955"/>
+            <a:ext cx="4853351" cy="769441"/>
+          </a:xfrm>
+          <a:prstGeom prst="rect">
+            <a:avLst/>
+          </a:prstGeom>
+          <a:noFill/>
+        </p:spPr>
+        <p:txBody>
+          <a:bodyPr wrap="square" rtlCol="0">
+            <a:spAutoFit/>
+          </a:bodyPr>
+          <a:lstStyle/>
+          <a:p>
+            <a:r>
+              <a:rPr lang="fr-FR" sz="4400" dirty="0" smtClean="0">
+                <a:latin typeface="Calibri" panose="020F0502020204030204" pitchFamily="34" charset="0"/>
+              </a:rPr>
+              <a:t>Appel de méthode</a:t>
+            </a:r>
+            <a:endParaRPr lang="fr-FR" sz="4400" dirty="0">
+              <a:latin typeface="Calibri" panose="020F0502020204030204" pitchFamily="34" charset="0"/>
             </a:endParaRPr>
           </a:p>
         </p:txBody>
@@ -4688,7 +4829,7 @@
                                           </p:stCondLst>
                                         </p:cTn>
                                         <p:tgtEl>
-                                          <p:spTgt spid="17"/>
+                                          <p:spTgt spid="6"/>
                                         </p:tgtEl>
                                         <p:attrNameLst>
                                           <p:attrName>style.visibility</p:attrName>
@@ -4702,7 +4843,7 @@
                                       <p:cBhvr>
                                         <p:cTn id="7" dur="500"/>
                                         <p:tgtEl>
-                                          <p:spTgt spid="17"/>
+                                          <p:spTgt spid="6"/>
                                         </p:tgtEl>
                                       </p:cBhvr>
                                     </p:animEffect>
@@ -4741,7 +4882,7 @@
                                           </p:stCondLst>
                                         </p:cTn>
                                         <p:tgtEl>
-                                          <p:spTgt spid="5"/>
+                                          <p:spTgt spid="17"/>
                                         </p:tgtEl>
                                         <p:attrNameLst>
                                           <p:attrName>style.visibility</p:attrName>
@@ -4755,6 +4896,59 @@
                                       <p:cBhvr>
                                         <p:cTn id="12" dur="500"/>
                                         <p:tgtEl>
+                                          <p:spTgt spid="17"/>
+                                        </p:tgtEl>
+                                      </p:cBhvr>
+                                    </p:animEffect>
+                                  </p:childTnLst>
+                                </p:cTn>
+                              </p:par>
+                            </p:childTnLst>
+                          </p:cTn>
+                        </p:par>
+                      </p:childTnLst>
+                    </p:cTn>
+                  </p:par>
+                  <p:par>
+                    <p:cTn id="13" fill="hold">
+                      <p:stCondLst>
+                        <p:cond delay="indefinite"/>
+                      </p:stCondLst>
+                      <p:childTnLst>
+                        <p:par>
+                          <p:cTn id="14" fill="hold">
+                            <p:stCondLst>
+                              <p:cond delay="0"/>
+                            </p:stCondLst>
+                            <p:childTnLst>
+                              <p:par>
+                                <p:cTn id="15" presetID="10" presetClass="entr" presetSubtype="0" fill="hold" grpId="0" nodeType="clickEffect">
+                                  <p:stCondLst>
+                                    <p:cond delay="0"/>
+                                  </p:stCondLst>
+                                  <p:childTnLst>
+                                    <p:set>
+                                      <p:cBhvr>
+                                        <p:cTn id="16" dur="1" fill="hold">
+                                          <p:stCondLst>
+                                            <p:cond delay="0"/>
+                                          </p:stCondLst>
+                                        </p:cTn>
+                                        <p:tgtEl>
+                                          <p:spTgt spid="5"/>
+                                        </p:tgtEl>
+                                        <p:attrNameLst>
+                                          <p:attrName>style.visibility</p:attrName>
+                                        </p:attrNameLst>
+                                      </p:cBhvr>
+                                      <p:to>
+                                        <p:strVal val="visible"/>
+                                      </p:to>
+                                    </p:set>
+                                    <p:animEffect transition="in" filter="fade">
+                                      <p:cBhvr>
+                                        <p:cTn id="17" dur="500"/>
+                                        <p:tgtEl>
                                           <p:spTgt spid="5"/>
                                         </p:tgtEl>
                                       </p:cBhvr>
@@ -4763,14 +4957,14 @@
                                 </p:cTn>
                               </p:par>
                               <p:par>
-                                <p:cTn id="13" presetID="10" presetClass="entr" presetSubtype="0" fill="hold" grpId="0" nodeType="withEffect">
+                                <p:cTn id="18" presetID="10" presetClass="entr" presetSubtype="0" fill="hold" grpId="0" nodeType="withEffect">
                                   <p:stCondLst>
                                     <p:cond delay="0"/>
                                   </p:stCondLst>
                                   <p:childTnLst>
                                     <p:set>
                                       <p:cBhvr>
-                                        <p:cTn id="14" dur="1" fill="hold">
+                                        <p:cTn id="19" dur="1" fill="hold">
                                           <p:stCondLst>
                                             <p:cond delay="0"/>
                                           </p:stCondLst>
@@ -4788,7 +4982,7 @@
                                     </p:set>
                                     <p:animEffect transition="in" filter="fade">
                                       <p:cBhvr>
-                                        <p:cTn id="15" dur="500"/>
+                                        <p:cTn id="20" dur="500"/>
                                         <p:tgtEl>
                                           <p:spTgt spid="10"/>
                                         </p:tgtEl>
@@ -4798,14 +4992,14 @@
                                 </p:cTn>
                               </p:par>
                               <p:par>
-                                <p:cTn id="16" presetID="10" presetClass="entr" presetSubtype="0" fill="hold" grpId="0" nodeType="withEffect">
+                                <p:cTn id="21" presetID="10" presetClass="entr" presetSubtype="0" fill="hold" grpId="0" nodeType="withEffect">
                                   <p:stCondLst>
                                     <p:cond delay="0"/>
                                   </p:stCondLst>
                                   <p:childTnLst>
                                     <p:set>
                                       <p:cBhvr>
-                                        <p:cTn id="17" dur="1" fill="hold">
+                                        <p:cTn id="22" dur="1" fill="hold">
                                           <p:stCondLst>
                                             <p:cond delay="0"/>
                                           </p:stCondLst>
@@ -4823,7 +5017,7 @@
                                     </p:set>
                                     <p:animEffect transition="in" filter="fade">
                                       <p:cBhvr>
-                                        <p:cTn id="18" dur="500"/>
+                                        <p:cTn id="23" dur="500"/>
                                         <p:tgtEl>
                                           <p:spTgt spid="13"/>
                                         </p:tgtEl>
@@ -4833,14 +5027,14 @@
                                 </p:cTn>
                               </p:par>
                               <p:par>
-                                <p:cTn id="19" presetID="10" presetClass="entr" presetSubtype="0" fill="hold" grpId="0" nodeType="withEffect">
+                                <p:cTn id="24" presetID="10" presetClass="entr" presetSubtype="0" fill="hold" grpId="0" nodeType="withEffect">
                                   <p:stCondLst>
                                     <p:cond delay="0"/>
                                   </p:stCondLst>
                                   <p:childTnLst>
                                     <p:set>
                                       <p:cBhvr>
-                                        <p:cTn id="20" dur="1" fill="hold">
+                                        <p:cTn id="25" dur="1" fill="hold">
                                           <p:stCondLst>
                                             <p:cond delay="0"/>
                                           </p:stCondLst>
@@ -4858,70 +5052,9 @@
                                     </p:set>
                                     <p:animEffect transition="in" filter="fade">
                                       <p:cBhvr>
-                                        <p:cTn id="21" dur="500"/>
+                                        <p:cTn id="26" dur="500"/>
                                         <p:tgtEl>
                                           <p:spTgt spid="14"/>
-                                        </p:tgtEl>
-                                      </p:cBhvr>
-                                    </p:animEffect>
-                                  </p:childTnLst>
-                                </p:cTn>
-                              </p:par>
-                            </p:childTnLst>
-                          </p:cTn>
-                        </p:par>
-                      </p:childTnLst>
-                    </p:cTn>
-                  </p:par>
-                  <p:par>
-                    <p:cTn id="22" fill="hold">
-                      <p:stCondLst>
-                        <p:cond delay="indefinite"/>
-                      </p:stCondLst>
-                      <p:childTnLst>
-                        <p:par>
-                          <p:cTn id="23" fill="hold">
-                            <p:stCondLst>
-                              <p:cond delay="0"/>
-                            </p:stCondLst>
-                            <p:childTnLst>
-                              <p:par>
-                                <p:cTn id="24" presetID="10" presetClass="entr" presetSubtype="0" fill="hold" nodeType="clickEffect">
-                                  <p:stCondLst>
-                                    <p:cond delay="0"/>
-                                  </p:stCondLst>
-                                  <p:childTnLst>
-                                    <p:set>
-                                      <p:cBhvr>
-                                        <p:cTn id="25" dur="1" fill="hold">
-                                          <p:stCondLst>
-                                            <p:cond delay="0"/>
-                                          </p:stCondLst>
-                                        </p:cTn>
-                                        <p:tgtEl>
-                                          <p:spTgt spid="3">
-                                            <p:txEl>
-                                              <p:pRg st="0" end="0"/>
-                                            </p:txEl>
-                                          </p:spTgt>
-                                        </p:tgtEl>
-                                        <p:attrNameLst>
-                                          <p:attrName>style.visibility</p:attrName>
-                                        </p:attrNameLst>
-                                      </p:cBhvr>
-                                      <p:to>
-                                        <p:strVal val="visible"/>
-                                      </p:to>
-                                    </p:set>
-                                    <p:animEffect transition="in" filter="fade">
-                                      <p:cBhvr>
-                                        <p:cTn id="26" dur="500"/>
-                                        <p:tgtEl>
-                                          <p:spTgt spid="3">
-                                            <p:txEl>
-                                              <p:pRg st="0" end="0"/>
-                                            </p:txEl>
-                                          </p:spTgt>
                                         </p:tgtEl>
                                       </p:cBhvr>
                                     </p:animEffect>
@@ -4947,7 +5080,7 @@
                             </p:stCondLst>
                             <p:childTnLst>
                               <p:par>
-                                <p:cTn id="29" presetID="10" presetClass="entr" presetSubtype="0" fill="hold" nodeType="clickEffect">
+                                <p:cTn id="29" presetID="10" presetClass="entr" presetSubtype="0" fill="hold" grpId="0" nodeType="clickEffect">
                                   <p:stCondLst>
                                     <p:cond delay="0"/>
                                   </p:stCondLst>
@@ -4960,7 +5093,7 @@
                                           </p:stCondLst>
                                         </p:cTn>
                                         <p:tgtEl>
-                                          <p:spTgt spid="16"/>
+                                          <p:spTgt spid="15"/>
                                         </p:tgtEl>
                                         <p:attrNameLst>
                                           <p:attrName>style.visibility</p:attrName>
@@ -4974,7 +5107,7 @@
                                       <p:cBhvr>
                                         <p:cTn id="31" dur="500"/>
                                         <p:tgtEl>
-                                          <p:spTgt spid="16"/>
+                                          <p:spTgt spid="15"/>
                                         </p:tgtEl>
                                       </p:cBhvr>
                                     </p:animEffect>
@@ -5000,7 +5133,7 @@
                             </p:stCondLst>
                             <p:childTnLst>
                               <p:par>
-                                <p:cTn id="34" presetID="10" presetClass="entr" presetSubtype="0" fill="hold" grpId="0" nodeType="clickEffect">
+                                <p:cTn id="34" presetID="10" presetClass="entr" presetSubtype="0" fill="hold" nodeType="clickEffect">
                                   <p:stCondLst>
                                     <p:cond delay="0"/>
                                   </p:stCondLst>
@@ -5008,6 +5141,67 @@
                                     <p:set>
                                       <p:cBhvr>
                                         <p:cTn id="35" dur="1" fill="hold">
+                                          <p:stCondLst>
+                                            <p:cond delay="0"/>
+                                          </p:stCondLst>
+                                        </p:cTn>
+                                        <p:tgtEl>
+                                          <p:spTgt spid="3">
+                                            <p:txEl>
+                                              <p:pRg st="0" end="0"/>
+                                            </p:txEl>
+                                          </p:spTgt>
+                                        </p:tgtEl>
+                                        <p:attrNameLst>
+                                          <p:attrName>style.visibility</p:attrName>
+                                        </p:attrNameLst>
+                                      </p:cBhvr>
+                                      <p:to>
+                                        <p:strVal val="visible"/>
+                                      </p:to>
+                                    </p:set>
+                                    <p:animEffect transition="in" filter="fade">
+                                      <p:cBhvr>
+                                        <p:cTn id="36" dur="500"/>
+                                        <p:tgtEl>
+                                          <p:spTgt spid="3">
+                                            <p:txEl>
+                                              <p:pRg st="0" end="0"/>
+                                            </p:txEl>
+                                          </p:spTgt>
+                                        </p:tgtEl>
+                                      </p:cBhvr>
+                                    </p:animEffect>
+                                  </p:childTnLst>
+                                </p:cTn>
+                              </p:par>
+                            </p:childTnLst>
+                          </p:cTn>
+                        </p:par>
+                      </p:childTnLst>
+                    </p:cTn>
+                  </p:par>
+                  <p:par>
+                    <p:cTn id="37" fill="hold">
+                      <p:stCondLst>
+                        <p:cond delay="indefinite"/>
+                      </p:stCondLst>
+                      <p:childTnLst>
+                        <p:par>
+                          <p:cTn id="38" fill="hold">
+                            <p:stCondLst>
+                              <p:cond delay="0"/>
+                            </p:stCondLst>
+                            <p:childTnLst>
+                              <p:par>
+                                <p:cTn id="39" presetID="10" presetClass="entr" presetSubtype="0" fill="hold" grpId="0" nodeType="clickEffect">
+                                  <p:stCondLst>
+                                    <p:cond delay="0"/>
+                                  </p:stCondLst>
+                                  <p:childTnLst>
+                                    <p:set>
+                                      <p:cBhvr>
+                                        <p:cTn id="40" dur="1" fill="hold">
                                           <p:stCondLst>
                                             <p:cond delay="0"/>
                                           </p:stCondLst>
@@ -5025,7 +5219,7 @@
                                     </p:set>
                                     <p:animEffect transition="in" filter="fade">
                                       <p:cBhvr>
-                                        <p:cTn id="36" dur="500"/>
+                                        <p:cTn id="41" dur="500"/>
                                         <p:tgtEl>
                                           <p:spTgt spid="18"/>
                                         </p:tgtEl>
@@ -5068,6 +5262,8 @@
       <p:bldP spid="13" grpId="0"/>
       <p:bldP spid="14" grpId="0"/>
       <p:bldP spid="18" grpId="0"/>
+      <p:bldP spid="6" grpId="0"/>
+      <p:bldP spid="15" grpId="0"/>
     </p:bldLst>
   </p:timing>
 </p:sld>

</xml_diff>